<commit_message>
Update Venn diagram. Without borders.
</commit_message>
<xml_diff>
--- a/project-rumble/etsa02_figures.pptx
+++ b/project-rumble/etsa02_figures.pptx
@@ -13,7 +13,7 @@
     <p:sldId id="260" r:id="rId7"/>
     <p:sldId id="261" r:id="rId8"/>
     <p:sldId id="265" r:id="rId9"/>
-    <p:sldId id="266" r:id="rId10"/>
+    <p:sldId id="267" r:id="rId10"/>
     <p:sldId id="262" r:id="rId11"/>
   </p:sldIdLst>
   <p:sldSz cx="12192000" cy="6858000"/>
@@ -126,7 +126,7 @@
             <p14:sldId id="260"/>
             <p14:sldId id="261"/>
             <p14:sldId id="265"/>
-            <p14:sldId id="266"/>
+            <p14:sldId id="267"/>
             <p14:sldId id="262"/>
           </p14:sldIdLst>
         </p14:section>
@@ -18297,7 +18297,7 @@
           <a:p>
             <a:fld id="{CACABD52-BF91-4CCE-9EEC-6A02225A646E}" type="datetimeFigureOut">
               <a:rPr lang="en-US" smtClean="0"/>
-              <a:t>2018-03-22</a:t>
+              <a:t>2018-04-14</a:t>
             </a:fld>
             <a:endParaRPr lang="en-US"/>
           </a:p>
@@ -18495,7 +18495,7 @@
           <a:p>
             <a:fld id="{CACABD52-BF91-4CCE-9EEC-6A02225A646E}" type="datetimeFigureOut">
               <a:rPr lang="en-US" smtClean="0"/>
-              <a:t>2018-03-22</a:t>
+              <a:t>2018-04-14</a:t>
             </a:fld>
             <a:endParaRPr lang="en-US"/>
           </a:p>
@@ -18703,7 +18703,7 @@
           <a:p>
             <a:fld id="{CACABD52-BF91-4CCE-9EEC-6A02225A646E}" type="datetimeFigureOut">
               <a:rPr lang="en-US" smtClean="0"/>
-              <a:t>2018-03-22</a:t>
+              <a:t>2018-04-14</a:t>
             </a:fld>
             <a:endParaRPr lang="en-US"/>
           </a:p>
@@ -18901,7 +18901,7 @@
           <a:p>
             <a:fld id="{CACABD52-BF91-4CCE-9EEC-6A02225A646E}" type="datetimeFigureOut">
               <a:rPr lang="en-US" smtClean="0"/>
-              <a:t>2018-03-22</a:t>
+              <a:t>2018-04-14</a:t>
             </a:fld>
             <a:endParaRPr lang="en-US"/>
           </a:p>
@@ -19176,7 +19176,7 @@
           <a:p>
             <a:fld id="{CACABD52-BF91-4CCE-9EEC-6A02225A646E}" type="datetimeFigureOut">
               <a:rPr lang="en-US" smtClean="0"/>
-              <a:t>2018-03-22</a:t>
+              <a:t>2018-04-14</a:t>
             </a:fld>
             <a:endParaRPr lang="en-US"/>
           </a:p>
@@ -19441,7 +19441,7 @@
           <a:p>
             <a:fld id="{CACABD52-BF91-4CCE-9EEC-6A02225A646E}" type="datetimeFigureOut">
               <a:rPr lang="en-US" smtClean="0"/>
-              <a:t>2018-03-22</a:t>
+              <a:t>2018-04-14</a:t>
             </a:fld>
             <a:endParaRPr lang="en-US"/>
           </a:p>
@@ -19853,7 +19853,7 @@
           <a:p>
             <a:fld id="{CACABD52-BF91-4CCE-9EEC-6A02225A646E}" type="datetimeFigureOut">
               <a:rPr lang="en-US" smtClean="0"/>
-              <a:t>2018-03-22</a:t>
+              <a:t>2018-04-14</a:t>
             </a:fld>
             <a:endParaRPr lang="en-US"/>
           </a:p>
@@ -19994,7 +19994,7 @@
           <a:p>
             <a:fld id="{CACABD52-BF91-4CCE-9EEC-6A02225A646E}" type="datetimeFigureOut">
               <a:rPr lang="en-US" smtClean="0"/>
-              <a:t>2018-03-22</a:t>
+              <a:t>2018-04-14</a:t>
             </a:fld>
             <a:endParaRPr lang="en-US"/>
           </a:p>
@@ -20107,7 +20107,7 @@
           <a:p>
             <a:fld id="{CACABD52-BF91-4CCE-9EEC-6A02225A646E}" type="datetimeFigureOut">
               <a:rPr lang="en-US" smtClean="0"/>
-              <a:t>2018-03-22</a:t>
+              <a:t>2018-04-14</a:t>
             </a:fld>
             <a:endParaRPr lang="en-US"/>
           </a:p>
@@ -20418,7 +20418,7 @@
           <a:p>
             <a:fld id="{CACABD52-BF91-4CCE-9EEC-6A02225A646E}" type="datetimeFigureOut">
               <a:rPr lang="en-US" smtClean="0"/>
-              <a:t>2018-03-22</a:t>
+              <a:t>2018-04-14</a:t>
             </a:fld>
             <a:endParaRPr lang="en-US"/>
           </a:p>
@@ -20706,7 +20706,7 @@
           <a:p>
             <a:fld id="{CACABD52-BF91-4CCE-9EEC-6A02225A646E}" type="datetimeFigureOut">
               <a:rPr lang="en-US" smtClean="0"/>
-              <a:t>2018-03-22</a:t>
+              <a:t>2018-04-14</a:t>
             </a:fld>
             <a:endParaRPr lang="en-US"/>
           </a:p>
@@ -20947,7 +20947,7 @@
           <a:p>
             <a:fld id="{CACABD52-BF91-4CCE-9EEC-6A02225A646E}" type="datetimeFigureOut">
               <a:rPr lang="en-US" smtClean="0"/>
-              <a:t>2018-03-22</a:t>
+              <a:t>2018-04-14</a:t>
             </a:fld>
             <a:endParaRPr lang="en-US"/>
           </a:p>
@@ -41047,10 +41047,277 @@
           <a:chExt cx="0" cy="0"/>
         </a:xfrm>
       </p:grpSpPr>
+      <p:sp>
+        <p:nvSpPr>
+          <p:cNvPr id="5" name="Oval 4">
+            <a:extLst>
+              <a:ext uri="{FF2B5EF4-FFF2-40B4-BE49-F238E27FC236}">
+                <a16:creationId xmlns:a16="http://schemas.microsoft.com/office/drawing/2014/main" id="{1BE905D4-A72F-472F-85B9-E5262CB9A9BA}"/>
+              </a:ext>
+            </a:extLst>
+          </p:cNvPr>
+          <p:cNvSpPr/>
+          <p:nvPr/>
+        </p:nvSpPr>
+        <p:spPr>
+          <a:xfrm>
+            <a:off x="2923413" y="717756"/>
+            <a:ext cx="3598606" cy="3429000"/>
+          </a:xfrm>
+          <a:prstGeom prst="ellipse">
+            <a:avLst/>
+          </a:prstGeom>
+          <a:noFill/>
+          <a:ln w="38100">
+            <a:noFill/>
+          </a:ln>
+        </p:spPr>
+        <p:style>
+          <a:lnRef idx="2">
+            <a:schemeClr val="accent1">
+              <a:shade val="50000"/>
+            </a:schemeClr>
+          </a:lnRef>
+          <a:fillRef idx="1">
+            <a:schemeClr val="accent1"/>
+          </a:fillRef>
+          <a:effectRef idx="0">
+            <a:schemeClr val="accent1"/>
+          </a:effectRef>
+          <a:fontRef idx="minor">
+            <a:schemeClr val="lt1"/>
+          </a:fontRef>
+        </p:style>
+        <p:txBody>
+          <a:bodyPr rtlCol="0" anchor="ctr"/>
+          <a:lstStyle/>
+          <a:p>
+            <a:pPr algn="ctr"/>
+            <a:endParaRPr lang="en-US"/>
+          </a:p>
+        </p:txBody>
+      </p:sp>
+      <p:sp>
+        <p:nvSpPr>
+          <p:cNvPr id="6" name="Oval 5">
+            <a:extLst>
+              <a:ext uri="{FF2B5EF4-FFF2-40B4-BE49-F238E27FC236}">
+                <a16:creationId xmlns:a16="http://schemas.microsoft.com/office/drawing/2014/main" id="{DA8FA223-F814-41D8-8A8C-99F6794FF949}"/>
+              </a:ext>
+            </a:extLst>
+          </p:cNvPr>
+          <p:cNvSpPr/>
+          <p:nvPr/>
+        </p:nvSpPr>
+        <p:spPr>
+          <a:xfrm>
+            <a:off x="4301613" y="3092246"/>
+            <a:ext cx="3598606" cy="3429000"/>
+          </a:xfrm>
+          <a:prstGeom prst="ellipse">
+            <a:avLst/>
+          </a:prstGeom>
+          <a:noFill/>
+          <a:ln w="38100">
+            <a:noFill/>
+          </a:ln>
+        </p:spPr>
+        <p:style>
+          <a:lnRef idx="2">
+            <a:schemeClr val="accent1">
+              <a:shade val="50000"/>
+            </a:schemeClr>
+          </a:lnRef>
+          <a:fillRef idx="1">
+            <a:schemeClr val="accent1"/>
+          </a:fillRef>
+          <a:effectRef idx="0">
+            <a:schemeClr val="accent1"/>
+          </a:effectRef>
+          <a:fontRef idx="minor">
+            <a:schemeClr val="lt1"/>
+          </a:fontRef>
+        </p:style>
+        <p:txBody>
+          <a:bodyPr rtlCol="0" anchor="ctr"/>
+          <a:lstStyle/>
+          <a:p>
+            <a:pPr algn="ctr"/>
+            <a:endParaRPr lang="en-US"/>
+          </a:p>
+        </p:txBody>
+      </p:sp>
+      <p:sp>
+        <p:nvSpPr>
+          <p:cNvPr id="7" name="Oval 6">
+            <a:extLst>
+              <a:ext uri="{FF2B5EF4-FFF2-40B4-BE49-F238E27FC236}">
+                <a16:creationId xmlns:a16="http://schemas.microsoft.com/office/drawing/2014/main" id="{2C06C390-1650-43A9-92CD-878AF82A2EDE}"/>
+              </a:ext>
+            </a:extLst>
+          </p:cNvPr>
+          <p:cNvSpPr/>
+          <p:nvPr/>
+        </p:nvSpPr>
+        <p:spPr>
+          <a:xfrm>
+            <a:off x="5656779" y="717756"/>
+            <a:ext cx="3598606" cy="3429000"/>
+          </a:xfrm>
+          <a:prstGeom prst="ellipse">
+            <a:avLst/>
+          </a:prstGeom>
+          <a:noFill/>
+          <a:ln w="38100">
+            <a:noFill/>
+          </a:ln>
+        </p:spPr>
+        <p:style>
+          <a:lnRef idx="2">
+            <a:schemeClr val="accent1">
+              <a:shade val="50000"/>
+            </a:schemeClr>
+          </a:lnRef>
+          <a:fillRef idx="1">
+            <a:schemeClr val="accent1"/>
+          </a:fillRef>
+          <a:effectRef idx="0">
+            <a:schemeClr val="accent1"/>
+          </a:effectRef>
+          <a:fontRef idx="minor">
+            <a:schemeClr val="lt1"/>
+          </a:fontRef>
+        </p:style>
+        <p:txBody>
+          <a:bodyPr rtlCol="0" anchor="ctr"/>
+          <a:lstStyle/>
+          <a:p>
+            <a:pPr algn="ctr"/>
+            <a:endParaRPr lang="en-US"/>
+          </a:p>
+        </p:txBody>
+      </p:sp>
+      <p:sp>
+        <p:nvSpPr>
+          <p:cNvPr id="8" name="Rectangle 7">
+            <a:extLst>
+              <a:ext uri="{FF2B5EF4-FFF2-40B4-BE49-F238E27FC236}">
+                <a16:creationId xmlns:a16="http://schemas.microsoft.com/office/drawing/2014/main" id="{42BB545C-B9B2-4B88-A085-D7573212A8A6}"/>
+              </a:ext>
+            </a:extLst>
+          </p:cNvPr>
+          <p:cNvSpPr/>
+          <p:nvPr/>
+        </p:nvSpPr>
+        <p:spPr>
+          <a:xfrm>
+            <a:off x="6914421" y="1909036"/>
+            <a:ext cx="1925528" cy="523220"/>
+          </a:xfrm>
+          <a:prstGeom prst="rect">
+            <a:avLst/>
+          </a:prstGeom>
+        </p:spPr>
+        <p:txBody>
+          <a:bodyPr wrap="none">
+            <a:spAutoFit/>
+          </a:bodyPr>
+          <a:lstStyle/>
+          <a:p>
+            <a:pPr algn="ctr"/>
+            <a:r>
+              <a:rPr lang="sv-SE" sz="2800" dirty="0" err="1">
+                <a:latin typeface="Arial" panose="020B0604020202020204" pitchFamily="34" charset="0"/>
+                <a:cs typeface="Arial" panose="020B0604020202020204" pitchFamily="34" charset="0"/>
+              </a:rPr>
+              <a:t>Monetizing</a:t>
+            </a:r>
+            <a:endParaRPr lang="en-US" dirty="0"/>
+          </a:p>
+        </p:txBody>
+      </p:sp>
+      <p:sp>
+        <p:nvSpPr>
+          <p:cNvPr id="9" name="Rectangle 8">
+            <a:extLst>
+              <a:ext uri="{FF2B5EF4-FFF2-40B4-BE49-F238E27FC236}">
+                <a16:creationId xmlns:a16="http://schemas.microsoft.com/office/drawing/2014/main" id="{822A8BCF-BF7A-45F3-AEB2-2A8B87E5DD2B}"/>
+              </a:ext>
+            </a:extLst>
+          </p:cNvPr>
+          <p:cNvSpPr/>
+          <p:nvPr/>
+        </p:nvSpPr>
+        <p:spPr>
+          <a:xfrm>
+            <a:off x="3225245" y="1909036"/>
+            <a:ext cx="2106667" cy="523220"/>
+          </a:xfrm>
+          <a:prstGeom prst="rect">
+            <a:avLst/>
+          </a:prstGeom>
+        </p:spPr>
+        <p:txBody>
+          <a:bodyPr wrap="none">
+            <a:spAutoFit/>
+          </a:bodyPr>
+          <a:lstStyle/>
+          <a:p>
+            <a:pPr algn="ctr"/>
+            <a:r>
+              <a:rPr lang="sv-SE" sz="2800" dirty="0">
+                <a:latin typeface="Arial" panose="020B0604020202020204" pitchFamily="34" charset="0"/>
+                <a:cs typeface="Arial" panose="020B0604020202020204" pitchFamily="34" charset="0"/>
+              </a:rPr>
+              <a:t>Engineering</a:t>
+            </a:r>
+            <a:endParaRPr lang="en-US" dirty="0"/>
+          </a:p>
+        </p:txBody>
+      </p:sp>
+      <p:sp>
+        <p:nvSpPr>
+          <p:cNvPr id="10" name="Rectangle 9">
+            <a:extLst>
+              <a:ext uri="{FF2B5EF4-FFF2-40B4-BE49-F238E27FC236}">
+                <a16:creationId xmlns:a16="http://schemas.microsoft.com/office/drawing/2014/main" id="{37CDA193-5920-4DBA-9F62-8C8CE4AE6FFB}"/>
+              </a:ext>
+            </a:extLst>
+          </p:cNvPr>
+          <p:cNvSpPr/>
+          <p:nvPr/>
+        </p:nvSpPr>
+        <p:spPr>
+          <a:xfrm>
+            <a:off x="5083383" y="4716587"/>
+            <a:ext cx="2084225" cy="523220"/>
+          </a:xfrm>
+          <a:prstGeom prst="rect">
+            <a:avLst/>
+          </a:prstGeom>
+        </p:spPr>
+        <p:txBody>
+          <a:bodyPr wrap="none">
+            <a:spAutoFit/>
+          </a:bodyPr>
+          <a:lstStyle/>
+          <a:p>
+            <a:pPr algn="ctr"/>
+            <a:r>
+              <a:rPr lang="sv-SE" sz="2800" dirty="0" err="1">
+                <a:latin typeface="Arial" panose="020B0604020202020204" pitchFamily="34" charset="0"/>
+                <a:cs typeface="Arial" panose="020B0604020202020204" pitchFamily="34" charset="0"/>
+              </a:rPr>
+              <a:t>Strategizing</a:t>
+            </a:r>
+            <a:endParaRPr lang="en-US" dirty="0"/>
+          </a:p>
+        </p:txBody>
+      </p:sp>
     </p:spTree>
     <p:extLst>
       <p:ext uri="{BB962C8B-B14F-4D97-AF65-F5344CB8AC3E}">
-        <p14:creationId xmlns:p14="http://schemas.microsoft.com/office/powerpoint/2010/main" val="206168235"/>
+        <p14:creationId xmlns:p14="http://schemas.microsoft.com/office/powerpoint/2010/main" val="314093017"/>
       </p:ext>
     </p:extLst>
   </p:cSld>

</xml_diff>

<commit_message>
Add SRS Review protocol to process figure
</commit_message>
<xml_diff>
--- a/project-rumble/etsa02_figures.pptx
+++ b/project-rumble/etsa02_figures.pptx
@@ -18297,7 +18297,7 @@
           <a:p>
             <a:fld id="{CACABD52-BF91-4CCE-9EEC-6A02225A646E}" type="datetimeFigureOut">
               <a:rPr lang="en-US" smtClean="0"/>
-              <a:t>2018-04-14</a:t>
+              <a:t>2018-04-24</a:t>
             </a:fld>
             <a:endParaRPr lang="en-US"/>
           </a:p>
@@ -18495,7 +18495,7 @@
           <a:p>
             <a:fld id="{CACABD52-BF91-4CCE-9EEC-6A02225A646E}" type="datetimeFigureOut">
               <a:rPr lang="en-US" smtClean="0"/>
-              <a:t>2018-04-14</a:t>
+              <a:t>2018-04-24</a:t>
             </a:fld>
             <a:endParaRPr lang="en-US"/>
           </a:p>
@@ -18703,7 +18703,7 @@
           <a:p>
             <a:fld id="{CACABD52-BF91-4CCE-9EEC-6A02225A646E}" type="datetimeFigureOut">
               <a:rPr lang="en-US" smtClean="0"/>
-              <a:t>2018-04-14</a:t>
+              <a:t>2018-04-24</a:t>
             </a:fld>
             <a:endParaRPr lang="en-US"/>
           </a:p>
@@ -18901,7 +18901,7 @@
           <a:p>
             <a:fld id="{CACABD52-BF91-4CCE-9EEC-6A02225A646E}" type="datetimeFigureOut">
               <a:rPr lang="en-US" smtClean="0"/>
-              <a:t>2018-04-14</a:t>
+              <a:t>2018-04-24</a:t>
             </a:fld>
             <a:endParaRPr lang="en-US"/>
           </a:p>
@@ -19176,7 +19176,7 @@
           <a:p>
             <a:fld id="{CACABD52-BF91-4CCE-9EEC-6A02225A646E}" type="datetimeFigureOut">
               <a:rPr lang="en-US" smtClean="0"/>
-              <a:t>2018-04-14</a:t>
+              <a:t>2018-04-24</a:t>
             </a:fld>
             <a:endParaRPr lang="en-US"/>
           </a:p>
@@ -19441,7 +19441,7 @@
           <a:p>
             <a:fld id="{CACABD52-BF91-4CCE-9EEC-6A02225A646E}" type="datetimeFigureOut">
               <a:rPr lang="en-US" smtClean="0"/>
-              <a:t>2018-04-14</a:t>
+              <a:t>2018-04-24</a:t>
             </a:fld>
             <a:endParaRPr lang="en-US"/>
           </a:p>
@@ -19853,7 +19853,7 @@
           <a:p>
             <a:fld id="{CACABD52-BF91-4CCE-9EEC-6A02225A646E}" type="datetimeFigureOut">
               <a:rPr lang="en-US" smtClean="0"/>
-              <a:t>2018-04-14</a:t>
+              <a:t>2018-04-24</a:t>
             </a:fld>
             <a:endParaRPr lang="en-US"/>
           </a:p>
@@ -19994,7 +19994,7 @@
           <a:p>
             <a:fld id="{CACABD52-BF91-4CCE-9EEC-6A02225A646E}" type="datetimeFigureOut">
               <a:rPr lang="en-US" smtClean="0"/>
-              <a:t>2018-04-14</a:t>
+              <a:t>2018-04-24</a:t>
             </a:fld>
             <a:endParaRPr lang="en-US"/>
           </a:p>
@@ -20107,7 +20107,7 @@
           <a:p>
             <a:fld id="{CACABD52-BF91-4CCE-9EEC-6A02225A646E}" type="datetimeFigureOut">
               <a:rPr lang="en-US" smtClean="0"/>
-              <a:t>2018-04-14</a:t>
+              <a:t>2018-04-24</a:t>
             </a:fld>
             <a:endParaRPr lang="en-US"/>
           </a:p>
@@ -20418,7 +20418,7 @@
           <a:p>
             <a:fld id="{CACABD52-BF91-4CCE-9EEC-6A02225A646E}" type="datetimeFigureOut">
               <a:rPr lang="en-US" smtClean="0"/>
-              <a:t>2018-04-14</a:t>
+              <a:t>2018-04-24</a:t>
             </a:fld>
             <a:endParaRPr lang="en-US"/>
           </a:p>
@@ -20706,7 +20706,7 @@
           <a:p>
             <a:fld id="{CACABD52-BF91-4CCE-9EEC-6A02225A646E}" type="datetimeFigureOut">
               <a:rPr lang="en-US" smtClean="0"/>
-              <a:t>2018-04-14</a:t>
+              <a:t>2018-04-24</a:t>
             </a:fld>
             <a:endParaRPr lang="en-US"/>
           </a:p>
@@ -20947,7 +20947,7 @@
           <a:p>
             <a:fld id="{CACABD52-BF91-4CCE-9EEC-6A02225A646E}" type="datetimeFigureOut">
               <a:rPr lang="en-US" smtClean="0"/>
-              <a:t>2018-04-14</a:t>
+              <a:t>2018-04-24</a:t>
             </a:fld>
             <a:endParaRPr lang="en-US"/>
           </a:p>
@@ -32855,8 +32855,8 @@
         </p:nvSpPr>
         <p:spPr>
           <a:xfrm>
-            <a:off x="157316" y="-334493"/>
-            <a:ext cx="3960059" cy="5559972"/>
+            <a:off x="391180" y="-334493"/>
+            <a:ext cx="3492332" cy="5559972"/>
           </a:xfrm>
           <a:prstGeom prst="rect">
             <a:avLst/>
@@ -33596,6 +33596,155 @@
                 <a:cs typeface="Arial" panose="020B0604020202020204" pitchFamily="34" charset="0"/>
               </a:rPr>
               <a:t>Canvas</a:t>
+            </a:r>
+            <a:endParaRPr lang="en-US" dirty="0"/>
+          </a:p>
+        </p:txBody>
+      </p:sp>
+      <p:sp>
+        <p:nvSpPr>
+          <p:cNvPr id="68" name="Folded Corner 14">
+            <a:extLst>
+              <a:ext uri="{FF2B5EF4-FFF2-40B4-BE49-F238E27FC236}">
+                <a16:creationId xmlns:a16="http://schemas.microsoft.com/office/drawing/2014/main" id="{4851922D-6330-4AD5-B0C9-1171A3DC914D}"/>
+              </a:ext>
+            </a:extLst>
+          </p:cNvPr>
+          <p:cNvSpPr/>
+          <p:nvPr/>
+        </p:nvSpPr>
+        <p:spPr>
+          <a:xfrm>
+            <a:off x="4036387" y="4000677"/>
+            <a:ext cx="398184" cy="565163"/>
+          </a:xfrm>
+          <a:prstGeom prst="foldedCorner">
+            <a:avLst/>
+          </a:prstGeom>
+          <a:solidFill>
+            <a:schemeClr val="bg1">
+              <a:lumMod val="85000"/>
+            </a:schemeClr>
+          </a:solidFill>
+        </p:spPr>
+        <p:style>
+          <a:lnRef idx="1">
+            <a:schemeClr val="dk1"/>
+          </a:lnRef>
+          <a:fillRef idx="2">
+            <a:schemeClr val="dk1"/>
+          </a:fillRef>
+          <a:effectRef idx="1">
+            <a:schemeClr val="dk1"/>
+          </a:effectRef>
+          <a:fontRef idx="minor">
+            <a:schemeClr val="dk1"/>
+          </a:fontRef>
+        </p:style>
+        <p:txBody>
+          <a:bodyPr rtlCol="0" anchor="ctr"/>
+          <a:lstStyle/>
+          <a:p>
+            <a:pPr algn="ctr"/>
+            <a:endParaRPr lang="en-US" dirty="0"/>
+          </a:p>
+        </p:txBody>
+      </p:sp>
+      <p:cxnSp>
+        <p:nvCxnSpPr>
+          <p:cNvPr id="69" name="Straight Arrow Connector 68">
+            <a:extLst>
+              <a:ext uri="{FF2B5EF4-FFF2-40B4-BE49-F238E27FC236}">
+                <a16:creationId xmlns:a16="http://schemas.microsoft.com/office/drawing/2014/main" id="{36CB2715-6B58-4602-89CE-B969E9C57AAC}"/>
+              </a:ext>
+            </a:extLst>
+          </p:cNvPr>
+          <p:cNvCxnSpPr>
+            <a:cxnSpLocks/>
+          </p:cNvCxnSpPr>
+          <p:nvPr/>
+        </p:nvCxnSpPr>
+        <p:spPr>
+          <a:xfrm flipV="1">
+            <a:off x="4302515" y="3944699"/>
+            <a:ext cx="558727" cy="282580"/>
+          </a:xfrm>
+          <a:prstGeom prst="straightConnector1">
+            <a:avLst/>
+          </a:prstGeom>
+          <a:ln w="12700">
+            <a:solidFill>
+              <a:schemeClr val="tx1"/>
+            </a:solidFill>
+            <a:headEnd type="none" w="med" len="med"/>
+            <a:tailEnd type="none" w="med" len="med"/>
+          </a:ln>
+        </p:spPr>
+        <p:style>
+          <a:lnRef idx="1">
+            <a:schemeClr val="accent1"/>
+          </a:lnRef>
+          <a:fillRef idx="0">
+            <a:schemeClr val="accent1"/>
+          </a:fillRef>
+          <a:effectRef idx="0">
+            <a:schemeClr val="accent1"/>
+          </a:effectRef>
+          <a:fontRef idx="minor">
+            <a:schemeClr val="tx1"/>
+          </a:fontRef>
+        </p:style>
+      </p:cxnSp>
+      <p:sp>
+        <p:nvSpPr>
+          <p:cNvPr id="72" name="Rectangle 71">
+            <a:extLst>
+              <a:ext uri="{FF2B5EF4-FFF2-40B4-BE49-F238E27FC236}">
+                <a16:creationId xmlns:a16="http://schemas.microsoft.com/office/drawing/2014/main" id="{60C5E4D9-52BD-4F41-9A0A-C1BE1ED4C80F}"/>
+              </a:ext>
+            </a:extLst>
+          </p:cNvPr>
+          <p:cNvSpPr/>
+          <p:nvPr/>
+        </p:nvSpPr>
+        <p:spPr>
+          <a:xfrm>
+            <a:off x="3906945" y="4556255"/>
+            <a:ext cx="642035" cy="646331"/>
+          </a:xfrm>
+          <a:prstGeom prst="rect">
+            <a:avLst/>
+          </a:prstGeom>
+        </p:spPr>
+        <p:txBody>
+          <a:bodyPr wrap="none">
+            <a:spAutoFit/>
+          </a:bodyPr>
+          <a:lstStyle/>
+          <a:p>
+            <a:pPr algn="ctr"/>
+            <a:r>
+              <a:rPr lang="sv-SE" dirty="0">
+                <a:solidFill>
+                  <a:schemeClr val="tx1"/>
+                </a:solidFill>
+                <a:latin typeface="Arial" panose="020B0604020202020204" pitchFamily="34" charset="0"/>
+                <a:cs typeface="Arial" panose="020B0604020202020204" pitchFamily="34" charset="0"/>
+              </a:rPr>
+              <a:t>Rev.</a:t>
+            </a:r>
+          </a:p>
+          <a:p>
+            <a:pPr algn="ctr"/>
+            <a:r>
+              <a:rPr lang="sv-SE" dirty="0" err="1">
+                <a:solidFill>
+                  <a:schemeClr val="tx1"/>
+                </a:solidFill>
+                <a:latin typeface="Arial" panose="020B0604020202020204" pitchFamily="34" charset="0"/>
+                <a:cs typeface="Arial" panose="020B0604020202020204" pitchFamily="34" charset="0"/>
+              </a:rPr>
+              <a:t>prot</a:t>
             </a:r>
             <a:endParaRPr lang="en-US" dirty="0"/>
           </a:p>

</xml_diff>